<commit_message>
Working with splitting the events table
</commit_message>
<xml_diff>
--- a/instruction_images/instructions for the experiment.pptx
+++ b/instruction_images/instructions for the experiment.pptx
@@ -274,7 +274,7 @@
           <a:p>
             <a:fld id="{9FE59301-7B31-473A-80A6-657729B6749B}" type="datetimeFigureOut">
               <a:rPr lang="en-IL" smtClean="0"/>
-              <a:t>06/10/2022</a:t>
+              <a:t>04/01/2023</a:t>
             </a:fld>
             <a:endParaRPr lang="en-IL"/>
           </a:p>
@@ -474,7 +474,7 @@
           <a:p>
             <a:fld id="{9FE59301-7B31-473A-80A6-657729B6749B}" type="datetimeFigureOut">
               <a:rPr lang="en-IL" smtClean="0"/>
-              <a:t>06/10/2022</a:t>
+              <a:t>04/01/2023</a:t>
             </a:fld>
             <a:endParaRPr lang="en-IL"/>
           </a:p>
@@ -684,7 +684,7 @@
           <a:p>
             <a:fld id="{9FE59301-7B31-473A-80A6-657729B6749B}" type="datetimeFigureOut">
               <a:rPr lang="en-IL" smtClean="0"/>
-              <a:t>06/10/2022</a:t>
+              <a:t>04/01/2023</a:t>
             </a:fld>
             <a:endParaRPr lang="en-IL"/>
           </a:p>
@@ -884,7 +884,7 @@
           <a:p>
             <a:fld id="{9FE59301-7B31-473A-80A6-657729B6749B}" type="datetimeFigureOut">
               <a:rPr lang="en-IL" smtClean="0"/>
-              <a:t>06/10/2022</a:t>
+              <a:t>04/01/2023</a:t>
             </a:fld>
             <a:endParaRPr lang="en-IL"/>
           </a:p>
@@ -1160,7 +1160,7 @@
           <a:p>
             <a:fld id="{9FE59301-7B31-473A-80A6-657729B6749B}" type="datetimeFigureOut">
               <a:rPr lang="en-IL" smtClean="0"/>
-              <a:t>06/10/2022</a:t>
+              <a:t>04/01/2023</a:t>
             </a:fld>
             <a:endParaRPr lang="en-IL"/>
           </a:p>
@@ -1428,7 +1428,7 @@
           <a:p>
             <a:fld id="{9FE59301-7B31-473A-80A6-657729B6749B}" type="datetimeFigureOut">
               <a:rPr lang="en-IL" smtClean="0"/>
-              <a:t>06/10/2022</a:t>
+              <a:t>04/01/2023</a:t>
             </a:fld>
             <a:endParaRPr lang="en-IL"/>
           </a:p>
@@ -1843,7 +1843,7 @@
           <a:p>
             <a:fld id="{9FE59301-7B31-473A-80A6-657729B6749B}" type="datetimeFigureOut">
               <a:rPr lang="en-IL" smtClean="0"/>
-              <a:t>06/10/2022</a:t>
+              <a:t>04/01/2023</a:t>
             </a:fld>
             <a:endParaRPr lang="en-IL"/>
           </a:p>
@@ -1985,7 +1985,7 @@
           <a:p>
             <a:fld id="{9FE59301-7B31-473A-80A6-657729B6749B}" type="datetimeFigureOut">
               <a:rPr lang="en-IL" smtClean="0"/>
-              <a:t>06/10/2022</a:t>
+              <a:t>04/01/2023</a:t>
             </a:fld>
             <a:endParaRPr lang="en-IL"/>
           </a:p>
@@ -2098,7 +2098,7 @@
           <a:p>
             <a:fld id="{9FE59301-7B31-473A-80A6-657729B6749B}" type="datetimeFigureOut">
               <a:rPr lang="en-IL" smtClean="0"/>
-              <a:t>06/10/2022</a:t>
+              <a:t>04/01/2023</a:t>
             </a:fld>
             <a:endParaRPr lang="en-IL"/>
           </a:p>
@@ -2411,7 +2411,7 @@
           <a:p>
             <a:fld id="{9FE59301-7B31-473A-80A6-657729B6749B}" type="datetimeFigureOut">
               <a:rPr lang="en-IL" smtClean="0"/>
-              <a:t>06/10/2022</a:t>
+              <a:t>04/01/2023</a:t>
             </a:fld>
             <a:endParaRPr lang="en-IL"/>
           </a:p>
@@ -2700,7 +2700,7 @@
           <a:p>
             <a:fld id="{9FE59301-7B31-473A-80A6-657729B6749B}" type="datetimeFigureOut">
               <a:rPr lang="en-IL" smtClean="0"/>
-              <a:t>06/10/2022</a:t>
+              <a:t>04/01/2023</a:t>
             </a:fld>
             <a:endParaRPr lang="en-IL"/>
           </a:p>
@@ -2943,7 +2943,7 @@
           <a:p>
             <a:fld id="{9FE59301-7B31-473A-80A6-657729B6749B}" type="datetimeFigureOut">
               <a:rPr lang="en-IL" smtClean="0"/>
-              <a:t>06/10/2022</a:t>
+              <a:t>04/01/2023</a:t>
             </a:fld>
             <a:endParaRPr lang="en-IL"/>
           </a:p>
@@ -4616,7 +4616,21 @@
                 <a:latin typeface="Alef" panose="00000500000000000000" pitchFamily="2" charset="-79"/>
                 <a:cs typeface="Alef" panose="00000500000000000000" pitchFamily="2" charset="-79"/>
               </a:rPr>
-              <a:t>בחלק הבא תושמע הקלטה של הרצף אותו למדת, באוזן ימין ובאוזן שמאל.</a:t>
+              <a:t>בחלק הבא תושמע הקלטה של הרצף אותו למדת</a:t>
+            </a:r>
+            <a:r>
+              <a:rPr lang="he-IL" sz="4000">
+                <a:latin typeface="Alef" panose="00000500000000000000" pitchFamily="2" charset="-79"/>
+                <a:cs typeface="Alef" panose="00000500000000000000" pitchFamily="2" charset="-79"/>
+              </a:rPr>
+              <a:t>, לפעמים באוזן ימין ולפעמים בשמאל</a:t>
+            </a:r>
+            <a:r>
+              <a:rPr lang="he-IL" sz="4000" dirty="0">
+                <a:latin typeface="Alef" panose="00000500000000000000" pitchFamily="2" charset="-79"/>
+                <a:cs typeface="Alef" panose="00000500000000000000" pitchFamily="2" charset="-79"/>
+              </a:rPr>
+              <a:t>.</a:t>
             </a:r>
             <a:br>
               <a:rPr lang="he-IL" sz="4000" dirty="0">

</xml_diff>

<commit_message>
Many changes - comments from batel + sequence change
</commit_message>
<xml_diff>
--- a/instruction_images/instructions for the experiment.pptx
+++ b/instruction_images/instructions for the experiment.pptx
@@ -11,14 +11,16 @@
     <p:sldId id="295" r:id="rId5"/>
     <p:sldId id="267" r:id="rId6"/>
     <p:sldId id="268" r:id="rId7"/>
-    <p:sldId id="296" r:id="rId8"/>
-    <p:sldId id="269" r:id="rId9"/>
-    <p:sldId id="290" r:id="rId10"/>
-    <p:sldId id="270" r:id="rId11"/>
-    <p:sldId id="298" r:id="rId12"/>
-    <p:sldId id="299" r:id="rId13"/>
-    <p:sldId id="300" r:id="rId14"/>
-    <p:sldId id="292" r:id="rId15"/>
+    <p:sldId id="301" r:id="rId8"/>
+    <p:sldId id="302" r:id="rId9"/>
+    <p:sldId id="296" r:id="rId10"/>
+    <p:sldId id="269" r:id="rId11"/>
+    <p:sldId id="290" r:id="rId12"/>
+    <p:sldId id="270" r:id="rId13"/>
+    <p:sldId id="298" r:id="rId14"/>
+    <p:sldId id="299" r:id="rId15"/>
+    <p:sldId id="300" r:id="rId16"/>
+    <p:sldId id="292" r:id="rId17"/>
   </p:sldIdLst>
   <p:sldSz cx="12192000" cy="6858000"/>
   <p:notesSz cx="6858000" cy="9144000"/>
@@ -274,7 +276,7 @@
           <a:p>
             <a:fld id="{9FE59301-7B31-473A-80A6-657729B6749B}" type="datetimeFigureOut">
               <a:rPr lang="en-IL" smtClean="0"/>
-              <a:t>04/01/2023</a:t>
+              <a:t>10/01/2023</a:t>
             </a:fld>
             <a:endParaRPr lang="en-IL"/>
           </a:p>
@@ -474,7 +476,7 @@
           <a:p>
             <a:fld id="{9FE59301-7B31-473A-80A6-657729B6749B}" type="datetimeFigureOut">
               <a:rPr lang="en-IL" smtClean="0"/>
-              <a:t>04/01/2023</a:t>
+              <a:t>10/01/2023</a:t>
             </a:fld>
             <a:endParaRPr lang="en-IL"/>
           </a:p>
@@ -684,7 +686,7 @@
           <a:p>
             <a:fld id="{9FE59301-7B31-473A-80A6-657729B6749B}" type="datetimeFigureOut">
               <a:rPr lang="en-IL" smtClean="0"/>
-              <a:t>04/01/2023</a:t>
+              <a:t>10/01/2023</a:t>
             </a:fld>
             <a:endParaRPr lang="en-IL"/>
           </a:p>
@@ -884,7 +886,7 @@
           <a:p>
             <a:fld id="{9FE59301-7B31-473A-80A6-657729B6749B}" type="datetimeFigureOut">
               <a:rPr lang="en-IL" smtClean="0"/>
-              <a:t>04/01/2023</a:t>
+              <a:t>10/01/2023</a:t>
             </a:fld>
             <a:endParaRPr lang="en-IL"/>
           </a:p>
@@ -1160,7 +1162,7 @@
           <a:p>
             <a:fld id="{9FE59301-7B31-473A-80A6-657729B6749B}" type="datetimeFigureOut">
               <a:rPr lang="en-IL" smtClean="0"/>
-              <a:t>04/01/2023</a:t>
+              <a:t>10/01/2023</a:t>
             </a:fld>
             <a:endParaRPr lang="en-IL"/>
           </a:p>
@@ -1428,7 +1430,7 @@
           <a:p>
             <a:fld id="{9FE59301-7B31-473A-80A6-657729B6749B}" type="datetimeFigureOut">
               <a:rPr lang="en-IL" smtClean="0"/>
-              <a:t>04/01/2023</a:t>
+              <a:t>10/01/2023</a:t>
             </a:fld>
             <a:endParaRPr lang="en-IL"/>
           </a:p>
@@ -1843,7 +1845,7 @@
           <a:p>
             <a:fld id="{9FE59301-7B31-473A-80A6-657729B6749B}" type="datetimeFigureOut">
               <a:rPr lang="en-IL" smtClean="0"/>
-              <a:t>04/01/2023</a:t>
+              <a:t>10/01/2023</a:t>
             </a:fld>
             <a:endParaRPr lang="en-IL"/>
           </a:p>
@@ -1985,7 +1987,7 @@
           <a:p>
             <a:fld id="{9FE59301-7B31-473A-80A6-657729B6749B}" type="datetimeFigureOut">
               <a:rPr lang="en-IL" smtClean="0"/>
-              <a:t>04/01/2023</a:t>
+              <a:t>10/01/2023</a:t>
             </a:fld>
             <a:endParaRPr lang="en-IL"/>
           </a:p>
@@ -2098,7 +2100,7 @@
           <a:p>
             <a:fld id="{9FE59301-7B31-473A-80A6-657729B6749B}" type="datetimeFigureOut">
               <a:rPr lang="en-IL" smtClean="0"/>
-              <a:t>04/01/2023</a:t>
+              <a:t>10/01/2023</a:t>
             </a:fld>
             <a:endParaRPr lang="en-IL"/>
           </a:p>
@@ -2411,7 +2413,7 @@
           <a:p>
             <a:fld id="{9FE59301-7B31-473A-80A6-657729B6749B}" type="datetimeFigureOut">
               <a:rPr lang="en-IL" smtClean="0"/>
-              <a:t>04/01/2023</a:t>
+              <a:t>10/01/2023</a:t>
             </a:fld>
             <a:endParaRPr lang="en-IL"/>
           </a:p>
@@ -2700,7 +2702,7 @@
           <a:p>
             <a:fld id="{9FE59301-7B31-473A-80A6-657729B6749B}" type="datetimeFigureOut">
               <a:rPr lang="en-IL" smtClean="0"/>
-              <a:t>04/01/2023</a:t>
+              <a:t>10/01/2023</a:t>
             </a:fld>
             <a:endParaRPr lang="en-IL"/>
           </a:p>
@@ -2943,7 +2945,7 @@
           <a:p>
             <a:fld id="{9FE59301-7B31-473A-80A6-657729B6749B}" type="datetimeFigureOut">
               <a:rPr lang="en-IL" smtClean="0"/>
-              <a:t>04/01/2023</a:t>
+              <a:t>10/01/2023</a:t>
             </a:fld>
             <a:endParaRPr lang="en-IL"/>
           </a:p>
@@ -3479,80 +3481,23 @@
         </p:nvSpPr>
         <p:spPr>
           <a:xfrm>
-            <a:off x="1158356" y="3022124"/>
-            <a:ext cx="10064620" cy="813751"/>
+            <a:off x="1244081" y="2967807"/>
+            <a:ext cx="10064620" cy="922386"/>
           </a:xfrm>
         </p:spPr>
         <p:txBody>
           <a:bodyPr anchor="ctr">
-            <a:normAutofit fontScale="90000"/>
+            <a:normAutofit/>
           </a:bodyPr>
           <a:lstStyle/>
           <a:p>
-            <a:pPr rtl="1"/>
-            <a:br>
+            <a:r>
               <a:rPr lang="en-US" sz="5000" dirty="0">
                 <a:latin typeface="Alef" panose="00000500000000000000" pitchFamily="2" charset="-79"/>
                 <a:cs typeface="Alef" panose="00000500000000000000" pitchFamily="2" charset="-79"/>
               </a:rPr>
-            </a:br>
-            <a:br>
-              <a:rPr lang="en-US" sz="5000" dirty="0">
-                <a:latin typeface="Alef" panose="00000500000000000000" pitchFamily="2" charset="-79"/>
-                <a:cs typeface="Alef" panose="00000500000000000000" pitchFamily="2" charset="-79"/>
-              </a:rPr>
-            </a:br>
-            <a:br>
-              <a:rPr lang="en-US" sz="5000" dirty="0">
-                <a:latin typeface="Alef" panose="00000500000000000000" pitchFamily="2" charset="-79"/>
-                <a:cs typeface="Alef" panose="00000500000000000000" pitchFamily="2" charset="-79"/>
-              </a:rPr>
-            </a:br>
-            <a:r>
-              <a:rPr lang="he-IL" sz="5000" dirty="0">
-                <a:latin typeface="Alef" panose="00000500000000000000" pitchFamily="2" charset="-79"/>
-                <a:cs typeface="Alef" panose="00000500000000000000" pitchFamily="2" charset="-79"/>
-              </a:rPr>
-              <a:t>במהלך הבלוק הקרוב נא לנגן ביד</a:t>
-            </a:r>
-            <a:br>
-              <a:rPr lang="en-US" sz="5000" dirty="0">
-                <a:latin typeface="Alef" panose="00000500000000000000" pitchFamily="2" charset="-79"/>
-                <a:cs typeface="Alef" panose="00000500000000000000" pitchFamily="2" charset="-79"/>
-              </a:rPr>
-            </a:br>
-            <a:r>
-              <a:rPr lang="he-IL" sz="5000" dirty="0">
-                <a:latin typeface="Alef" panose="00000500000000000000" pitchFamily="2" charset="-79"/>
-                <a:cs typeface="Alef" panose="00000500000000000000" pitchFamily="2" charset="-79"/>
-              </a:rPr>
-              <a:t> </a:t>
-            </a:r>
-            <a:r>
-              <a:rPr lang="he-IL" sz="5000" b="1" dirty="0">
-                <a:latin typeface="Alef" panose="00000500000000000000" pitchFamily="2" charset="-79"/>
-                <a:cs typeface="Alef" panose="00000500000000000000" pitchFamily="2" charset="-79"/>
-              </a:rPr>
-              <a:t>ימין</a:t>
-            </a:r>
-            <a:br>
-              <a:rPr lang="he-IL" sz="5000" dirty="0">
-                <a:latin typeface="Alef" panose="00000500000000000000" pitchFamily="2" charset="-79"/>
-                <a:cs typeface="Alef" panose="00000500000000000000" pitchFamily="2" charset="-79"/>
-              </a:rPr>
-            </a:br>
-            <a:br>
-              <a:rPr lang="he-IL" sz="5000" b="1" dirty="0">
-                <a:latin typeface="Alef" panose="00000500000000000000" pitchFamily="2" charset="-79"/>
-                <a:cs typeface="Alef" panose="00000500000000000000" pitchFamily="2" charset="-79"/>
-              </a:rPr>
-            </a:br>
-            <a:br>
-              <a:rPr lang="en-US" sz="5000" dirty="0">
-                <a:latin typeface="Alef" panose="00000500000000000000" pitchFamily="2" charset="-79"/>
-                <a:cs typeface="Alef" panose="00000500000000000000" pitchFamily="2" charset="-79"/>
-              </a:rPr>
-            </a:br>
+              <a:t>Get ready…</a:t>
+            </a:r>
             <a:endParaRPr lang="en-IL" sz="5000" dirty="0">
               <a:latin typeface="Alef" panose="00000500000000000000" pitchFamily="2" charset="-79"/>
               <a:cs typeface="Alef" panose="00000500000000000000" pitchFamily="2" charset="-79"/>
@@ -3563,7 +3508,7 @@
     </p:spTree>
     <p:extLst>
       <p:ext uri="{BB962C8B-B14F-4D97-AF65-F5344CB8AC3E}">
-        <p14:creationId xmlns:p14="http://schemas.microsoft.com/office/powerpoint/2010/main" val="1141962034"/>
+        <p14:creationId xmlns:p14="http://schemas.microsoft.com/office/powerpoint/2010/main" val="3960370162"/>
       </p:ext>
     </p:extLst>
   </p:cSld>
@@ -3616,80 +3561,24 @@
         </p:nvSpPr>
         <p:spPr>
           <a:xfrm>
-            <a:off x="1158356" y="3022124"/>
-            <a:ext cx="10064620" cy="813751"/>
+            <a:off x="1244081" y="2967807"/>
+            <a:ext cx="10064620" cy="922386"/>
           </a:xfrm>
+          <a:noFill/>
         </p:spPr>
         <p:txBody>
           <a:bodyPr anchor="ctr">
-            <a:normAutofit fontScale="90000"/>
+            <a:normAutofit/>
           </a:bodyPr>
           <a:lstStyle/>
           <a:p>
-            <a:pPr rtl="1"/>
-            <a:br>
+            <a:r>
               <a:rPr lang="en-US" sz="5000" dirty="0">
                 <a:latin typeface="Alef" panose="00000500000000000000" pitchFamily="2" charset="-79"/>
                 <a:cs typeface="Alef" panose="00000500000000000000" pitchFamily="2" charset="-79"/>
               </a:rPr>
-            </a:br>
-            <a:br>
-              <a:rPr lang="en-US" sz="5000" dirty="0">
-                <a:latin typeface="Alef" panose="00000500000000000000" pitchFamily="2" charset="-79"/>
-                <a:cs typeface="Alef" panose="00000500000000000000" pitchFamily="2" charset="-79"/>
-              </a:rPr>
-            </a:br>
-            <a:br>
-              <a:rPr lang="en-US" sz="5000" dirty="0">
-                <a:latin typeface="Alef" panose="00000500000000000000" pitchFamily="2" charset="-79"/>
-                <a:cs typeface="Alef" panose="00000500000000000000" pitchFamily="2" charset="-79"/>
-              </a:rPr>
-            </a:br>
-            <a:r>
-              <a:rPr lang="he-IL" sz="5000" dirty="0">
-                <a:latin typeface="Alef" panose="00000500000000000000" pitchFamily="2" charset="-79"/>
-                <a:cs typeface="Alef" panose="00000500000000000000" pitchFamily="2" charset="-79"/>
-              </a:rPr>
-              <a:t>במהלך הבלוק הקרוב נא לנגן ביד</a:t>
-            </a:r>
-            <a:br>
-              <a:rPr lang="en-US" sz="5000" dirty="0">
-                <a:latin typeface="Alef" panose="00000500000000000000" pitchFamily="2" charset="-79"/>
-                <a:cs typeface="Alef" panose="00000500000000000000" pitchFamily="2" charset="-79"/>
-              </a:rPr>
-            </a:br>
-            <a:r>
-              <a:rPr lang="he-IL" sz="5000" dirty="0">
-                <a:latin typeface="Alef" panose="00000500000000000000" pitchFamily="2" charset="-79"/>
-                <a:cs typeface="Alef" panose="00000500000000000000" pitchFamily="2" charset="-79"/>
-              </a:rPr>
-              <a:t> </a:t>
-            </a:r>
-            <a:r>
-              <a:rPr lang="he-IL" sz="5000" b="1" dirty="0">
-                <a:latin typeface="Alef" panose="00000500000000000000" pitchFamily="2" charset="-79"/>
-                <a:cs typeface="Alef" panose="00000500000000000000" pitchFamily="2" charset="-79"/>
-              </a:rPr>
-              <a:t>שמאל</a:t>
-            </a:r>
-            <a:br>
-              <a:rPr lang="he-IL" sz="5000" dirty="0">
-                <a:latin typeface="Alef" panose="00000500000000000000" pitchFamily="2" charset="-79"/>
-                <a:cs typeface="Alef" panose="00000500000000000000" pitchFamily="2" charset="-79"/>
-              </a:rPr>
-            </a:br>
-            <a:br>
-              <a:rPr lang="he-IL" sz="5000" b="1" dirty="0">
-                <a:latin typeface="Alef" panose="00000500000000000000" pitchFamily="2" charset="-79"/>
-                <a:cs typeface="Alef" panose="00000500000000000000" pitchFamily="2" charset="-79"/>
-              </a:rPr>
-            </a:br>
-            <a:br>
-              <a:rPr lang="en-US" sz="5000" dirty="0">
-                <a:latin typeface="Alef" panose="00000500000000000000" pitchFamily="2" charset="-79"/>
-                <a:cs typeface="Alef" panose="00000500000000000000" pitchFamily="2" charset="-79"/>
-              </a:rPr>
-            </a:br>
+              <a:t>Listen</a:t>
+            </a:r>
             <a:endParaRPr lang="en-IL" sz="5000" dirty="0">
               <a:latin typeface="Alef" panose="00000500000000000000" pitchFamily="2" charset="-79"/>
               <a:cs typeface="Alef" panose="00000500000000000000" pitchFamily="2" charset="-79"/>
@@ -3700,12 +3589,12 @@
     </p:spTree>
     <p:extLst>
       <p:ext uri="{BB962C8B-B14F-4D97-AF65-F5344CB8AC3E}">
-        <p14:creationId xmlns:p14="http://schemas.microsoft.com/office/powerpoint/2010/main" val="1625712197"/>
+        <p14:creationId xmlns:p14="http://schemas.microsoft.com/office/powerpoint/2010/main" val="2212213509"/>
       </p:ext>
     </p:extLst>
   </p:cSld>
   <p:clrMapOvr>
-    <a:overrideClrMapping bg1="lt1" tx1="dk1" bg2="lt2" tx2="dk2" accent1="accent1" accent2="accent2" accent3="accent3" accent4="accent4" accent5="accent5" accent6="accent6" hlink="hlink" folHlink="folHlink"/>
+    <a:masterClrMapping/>
   </p:clrMapOvr>
 </p:sld>
 </file>
@@ -3787,7 +3676,7 @@
                 <a:latin typeface="Alef" panose="00000500000000000000" pitchFamily="2" charset="-79"/>
                 <a:cs typeface="Alef" panose="00000500000000000000" pitchFamily="2" charset="-79"/>
               </a:rPr>
-              <a:t>במהלך הבלוק הקרוב נא להשתמש ביד</a:t>
+              <a:t>במהלך הבלוק הקרוב נא לנגן ביד</a:t>
             </a:r>
             <a:br>
               <a:rPr lang="en-US" sz="5000" dirty="0">
@@ -3837,12 +3726,12 @@
     </p:spTree>
     <p:extLst>
       <p:ext uri="{BB962C8B-B14F-4D97-AF65-F5344CB8AC3E}">
-        <p14:creationId xmlns:p14="http://schemas.microsoft.com/office/powerpoint/2010/main" val="1241782769"/>
+        <p14:creationId xmlns:p14="http://schemas.microsoft.com/office/powerpoint/2010/main" val="1141962034"/>
       </p:ext>
     </p:extLst>
   </p:cSld>
   <p:clrMapOvr>
-    <a:overrideClrMapping bg1="lt1" tx1="dk1" bg2="lt2" tx2="dk2" accent1="accent1" accent2="accent2" accent3="accent3" accent4="accent4" accent5="accent5" accent6="accent6" hlink="hlink" folHlink="folHlink"/>
+    <a:masterClrMapping/>
   </p:clrMapOvr>
 </p:sld>
 </file>
@@ -3924,6 +3813,280 @@
                 <a:latin typeface="Alef" panose="00000500000000000000" pitchFamily="2" charset="-79"/>
                 <a:cs typeface="Alef" panose="00000500000000000000" pitchFamily="2" charset="-79"/>
               </a:rPr>
+              <a:t>במהלך הבלוק הקרוב נא לנגן ביד</a:t>
+            </a:r>
+            <a:br>
+              <a:rPr lang="en-US" sz="5000" dirty="0">
+                <a:latin typeface="Alef" panose="00000500000000000000" pitchFamily="2" charset="-79"/>
+                <a:cs typeface="Alef" panose="00000500000000000000" pitchFamily="2" charset="-79"/>
+              </a:rPr>
+            </a:br>
+            <a:r>
+              <a:rPr lang="he-IL" sz="5000" dirty="0">
+                <a:latin typeface="Alef" panose="00000500000000000000" pitchFamily="2" charset="-79"/>
+                <a:cs typeface="Alef" panose="00000500000000000000" pitchFamily="2" charset="-79"/>
+              </a:rPr>
+              <a:t> </a:t>
+            </a:r>
+            <a:r>
+              <a:rPr lang="he-IL" sz="5000" b="1" dirty="0">
+                <a:latin typeface="Alef" panose="00000500000000000000" pitchFamily="2" charset="-79"/>
+                <a:cs typeface="Alef" panose="00000500000000000000" pitchFamily="2" charset="-79"/>
+              </a:rPr>
+              <a:t>שמאל</a:t>
+            </a:r>
+            <a:br>
+              <a:rPr lang="he-IL" sz="5000" dirty="0">
+                <a:latin typeface="Alef" panose="00000500000000000000" pitchFamily="2" charset="-79"/>
+                <a:cs typeface="Alef" panose="00000500000000000000" pitchFamily="2" charset="-79"/>
+              </a:rPr>
+            </a:br>
+            <a:br>
+              <a:rPr lang="he-IL" sz="5000" b="1" dirty="0">
+                <a:latin typeface="Alef" panose="00000500000000000000" pitchFamily="2" charset="-79"/>
+                <a:cs typeface="Alef" panose="00000500000000000000" pitchFamily="2" charset="-79"/>
+              </a:rPr>
+            </a:br>
+            <a:br>
+              <a:rPr lang="en-US" sz="5000" dirty="0">
+                <a:latin typeface="Alef" panose="00000500000000000000" pitchFamily="2" charset="-79"/>
+                <a:cs typeface="Alef" panose="00000500000000000000" pitchFamily="2" charset="-79"/>
+              </a:rPr>
+            </a:br>
+            <a:endParaRPr lang="en-IL" sz="5000" dirty="0">
+              <a:latin typeface="Alef" panose="00000500000000000000" pitchFamily="2" charset="-79"/>
+              <a:cs typeface="Alef" panose="00000500000000000000" pitchFamily="2" charset="-79"/>
+            </a:endParaRPr>
+          </a:p>
+        </p:txBody>
+      </p:sp>
+    </p:spTree>
+    <p:extLst>
+      <p:ext uri="{BB962C8B-B14F-4D97-AF65-F5344CB8AC3E}">
+        <p14:creationId xmlns:p14="http://schemas.microsoft.com/office/powerpoint/2010/main" val="1625712197"/>
+      </p:ext>
+    </p:extLst>
+  </p:cSld>
+  <p:clrMapOvr>
+    <a:overrideClrMapping bg1="lt1" tx1="dk1" bg2="lt2" tx2="dk2" accent1="accent1" accent2="accent2" accent3="accent3" accent4="accent4" accent5="accent5" accent6="accent6" hlink="hlink" folHlink="folHlink"/>
+  </p:clrMapOvr>
+</p:sld>
+</file>
+
+<file path=ppt/slides/slide14.xml><?xml version="1.0" encoding="utf-8"?>
+<p:sld xmlns:a="http://schemas.openxmlformats.org/drawingml/2006/main" xmlns:r="http://schemas.openxmlformats.org/officeDocument/2006/relationships" xmlns:p="http://schemas.openxmlformats.org/presentationml/2006/main">
+  <p:cSld>
+    <p:bg>
+      <p:bgPr>
+        <a:solidFill>
+          <a:schemeClr val="bg2"/>
+        </a:solidFill>
+        <a:effectLst/>
+      </p:bgPr>
+    </p:bg>
+    <p:spTree>
+      <p:nvGrpSpPr>
+        <p:cNvPr id="1" name=""/>
+        <p:cNvGrpSpPr/>
+        <p:nvPr/>
+      </p:nvGrpSpPr>
+      <p:grpSpPr>
+        <a:xfrm>
+          <a:off x="0" y="0"/>
+          <a:ext cx="0" cy="0"/>
+          <a:chOff x="0" y="0"/>
+          <a:chExt cx="0" cy="0"/>
+        </a:xfrm>
+      </p:grpSpPr>
+      <p:sp>
+        <p:nvSpPr>
+          <p:cNvPr id="2" name="Title 1">
+            <a:extLst>
+              <a:ext uri="{FF2B5EF4-FFF2-40B4-BE49-F238E27FC236}">
+                <a16:creationId xmlns:a16="http://schemas.microsoft.com/office/drawing/2014/main" id="{ACE86663-AE4B-19FA-35D6-91B28D424C56}"/>
+              </a:ext>
+            </a:extLst>
+          </p:cNvPr>
+          <p:cNvSpPr>
+            <a:spLocks noGrp="1"/>
+          </p:cNvSpPr>
+          <p:nvPr>
+            <p:ph type="ctrTitle"/>
+          </p:nvPr>
+        </p:nvSpPr>
+        <p:spPr>
+          <a:xfrm>
+            <a:off x="1158356" y="3022124"/>
+            <a:ext cx="10064620" cy="813751"/>
+          </a:xfrm>
+        </p:spPr>
+        <p:txBody>
+          <a:bodyPr anchor="ctr">
+            <a:normAutofit fontScale="90000"/>
+          </a:bodyPr>
+          <a:lstStyle/>
+          <a:p>
+            <a:pPr rtl="1"/>
+            <a:br>
+              <a:rPr lang="en-US" sz="5000" dirty="0">
+                <a:latin typeface="Alef" panose="00000500000000000000" pitchFamily="2" charset="-79"/>
+                <a:cs typeface="Alef" panose="00000500000000000000" pitchFamily="2" charset="-79"/>
+              </a:rPr>
+            </a:br>
+            <a:br>
+              <a:rPr lang="en-US" sz="5000" dirty="0">
+                <a:latin typeface="Alef" panose="00000500000000000000" pitchFamily="2" charset="-79"/>
+                <a:cs typeface="Alef" panose="00000500000000000000" pitchFamily="2" charset="-79"/>
+              </a:rPr>
+            </a:br>
+            <a:br>
+              <a:rPr lang="en-US" sz="5000" dirty="0">
+                <a:latin typeface="Alef" panose="00000500000000000000" pitchFamily="2" charset="-79"/>
+                <a:cs typeface="Alef" panose="00000500000000000000" pitchFamily="2" charset="-79"/>
+              </a:rPr>
+            </a:br>
+            <a:r>
+              <a:rPr lang="he-IL" sz="5000" dirty="0">
+                <a:latin typeface="Alef" panose="00000500000000000000" pitchFamily="2" charset="-79"/>
+                <a:cs typeface="Alef" panose="00000500000000000000" pitchFamily="2" charset="-79"/>
+              </a:rPr>
+              <a:t>במהלך הבלוק הקרוב נא להשתמש ביד</a:t>
+            </a:r>
+            <a:br>
+              <a:rPr lang="en-US" sz="5000" dirty="0">
+                <a:latin typeface="Alef" panose="00000500000000000000" pitchFamily="2" charset="-79"/>
+                <a:cs typeface="Alef" panose="00000500000000000000" pitchFamily="2" charset="-79"/>
+              </a:rPr>
+            </a:br>
+            <a:r>
+              <a:rPr lang="he-IL" sz="5000" dirty="0">
+                <a:latin typeface="Alef" panose="00000500000000000000" pitchFamily="2" charset="-79"/>
+                <a:cs typeface="Alef" panose="00000500000000000000" pitchFamily="2" charset="-79"/>
+              </a:rPr>
+              <a:t> </a:t>
+            </a:r>
+            <a:r>
+              <a:rPr lang="he-IL" sz="5000" b="1" dirty="0">
+                <a:latin typeface="Alef" panose="00000500000000000000" pitchFamily="2" charset="-79"/>
+                <a:cs typeface="Alef" panose="00000500000000000000" pitchFamily="2" charset="-79"/>
+              </a:rPr>
+              <a:t>ימין</a:t>
+            </a:r>
+            <a:br>
+              <a:rPr lang="he-IL" sz="5000" dirty="0">
+                <a:latin typeface="Alef" panose="00000500000000000000" pitchFamily="2" charset="-79"/>
+                <a:cs typeface="Alef" panose="00000500000000000000" pitchFamily="2" charset="-79"/>
+              </a:rPr>
+            </a:br>
+            <a:br>
+              <a:rPr lang="he-IL" sz="5000" b="1" dirty="0">
+                <a:latin typeface="Alef" panose="00000500000000000000" pitchFamily="2" charset="-79"/>
+                <a:cs typeface="Alef" panose="00000500000000000000" pitchFamily="2" charset="-79"/>
+              </a:rPr>
+            </a:br>
+            <a:br>
+              <a:rPr lang="en-US" sz="5000" dirty="0">
+                <a:latin typeface="Alef" panose="00000500000000000000" pitchFamily="2" charset="-79"/>
+                <a:cs typeface="Alef" panose="00000500000000000000" pitchFamily="2" charset="-79"/>
+              </a:rPr>
+            </a:br>
+            <a:endParaRPr lang="en-IL" sz="5000" dirty="0">
+              <a:latin typeface="Alef" panose="00000500000000000000" pitchFamily="2" charset="-79"/>
+              <a:cs typeface="Alef" panose="00000500000000000000" pitchFamily="2" charset="-79"/>
+            </a:endParaRPr>
+          </a:p>
+        </p:txBody>
+      </p:sp>
+    </p:spTree>
+    <p:extLst>
+      <p:ext uri="{BB962C8B-B14F-4D97-AF65-F5344CB8AC3E}">
+        <p14:creationId xmlns:p14="http://schemas.microsoft.com/office/powerpoint/2010/main" val="1241782769"/>
+      </p:ext>
+    </p:extLst>
+  </p:cSld>
+  <p:clrMapOvr>
+    <a:overrideClrMapping bg1="lt1" tx1="dk1" bg2="lt2" tx2="dk2" accent1="accent1" accent2="accent2" accent3="accent3" accent4="accent4" accent5="accent5" accent6="accent6" hlink="hlink" folHlink="folHlink"/>
+  </p:clrMapOvr>
+</p:sld>
+</file>
+
+<file path=ppt/slides/slide15.xml><?xml version="1.0" encoding="utf-8"?>
+<p:sld xmlns:a="http://schemas.openxmlformats.org/drawingml/2006/main" xmlns:r="http://schemas.openxmlformats.org/officeDocument/2006/relationships" xmlns:p="http://schemas.openxmlformats.org/presentationml/2006/main">
+  <p:cSld>
+    <p:bg>
+      <p:bgPr>
+        <a:solidFill>
+          <a:schemeClr val="bg2"/>
+        </a:solidFill>
+        <a:effectLst/>
+      </p:bgPr>
+    </p:bg>
+    <p:spTree>
+      <p:nvGrpSpPr>
+        <p:cNvPr id="1" name=""/>
+        <p:cNvGrpSpPr/>
+        <p:nvPr/>
+      </p:nvGrpSpPr>
+      <p:grpSpPr>
+        <a:xfrm>
+          <a:off x="0" y="0"/>
+          <a:ext cx="0" cy="0"/>
+          <a:chOff x="0" y="0"/>
+          <a:chExt cx="0" cy="0"/>
+        </a:xfrm>
+      </p:grpSpPr>
+      <p:sp>
+        <p:nvSpPr>
+          <p:cNvPr id="2" name="Title 1">
+            <a:extLst>
+              <a:ext uri="{FF2B5EF4-FFF2-40B4-BE49-F238E27FC236}">
+                <a16:creationId xmlns:a16="http://schemas.microsoft.com/office/drawing/2014/main" id="{ACE86663-AE4B-19FA-35D6-91B28D424C56}"/>
+              </a:ext>
+            </a:extLst>
+          </p:cNvPr>
+          <p:cNvSpPr>
+            <a:spLocks noGrp="1"/>
+          </p:cNvSpPr>
+          <p:nvPr>
+            <p:ph type="ctrTitle"/>
+          </p:nvPr>
+        </p:nvSpPr>
+        <p:spPr>
+          <a:xfrm>
+            <a:off x="1158356" y="3022124"/>
+            <a:ext cx="10064620" cy="813751"/>
+          </a:xfrm>
+        </p:spPr>
+        <p:txBody>
+          <a:bodyPr anchor="ctr">
+            <a:normAutofit fontScale="90000"/>
+          </a:bodyPr>
+          <a:lstStyle/>
+          <a:p>
+            <a:pPr rtl="1"/>
+            <a:br>
+              <a:rPr lang="en-US" sz="5000" dirty="0">
+                <a:latin typeface="Alef" panose="00000500000000000000" pitchFamily="2" charset="-79"/>
+                <a:cs typeface="Alef" panose="00000500000000000000" pitchFamily="2" charset="-79"/>
+              </a:rPr>
+            </a:br>
+            <a:br>
+              <a:rPr lang="en-US" sz="5000" dirty="0">
+                <a:latin typeface="Alef" panose="00000500000000000000" pitchFamily="2" charset="-79"/>
+                <a:cs typeface="Alef" panose="00000500000000000000" pitchFamily="2" charset="-79"/>
+              </a:rPr>
+            </a:br>
+            <a:br>
+              <a:rPr lang="en-US" sz="5000" dirty="0">
+                <a:latin typeface="Alef" panose="00000500000000000000" pitchFamily="2" charset="-79"/>
+                <a:cs typeface="Alef" panose="00000500000000000000" pitchFamily="2" charset="-79"/>
+              </a:rPr>
+            </a:br>
+            <a:r>
+              <a:rPr lang="he-IL" sz="5000" dirty="0">
+                <a:latin typeface="Alef" panose="00000500000000000000" pitchFamily="2" charset="-79"/>
+                <a:cs typeface="Alef" panose="00000500000000000000" pitchFamily="2" charset="-79"/>
+              </a:rPr>
               <a:t>במהלך הבלוק הקרוב נא להשתמש ביד</a:t>
             </a:r>
             <a:br>
@@ -3977,7 +4140,7 @@
 </p:sld>
 </file>
 
-<file path=ppt/slides/slide14.xml><?xml version="1.0" encoding="utf-8"?>
+<file path=ppt/slides/slide16.xml><?xml version="1.0" encoding="utf-8"?>
 <p:sld xmlns:a="http://schemas.openxmlformats.org/drawingml/2006/main" xmlns:r="http://schemas.openxmlformats.org/officeDocument/2006/relationships" xmlns:p="http://schemas.openxmlformats.org/presentationml/2006/main">
   <p:cSld>
     <p:bg>
@@ -4187,21 +4350,7 @@
                 <a:latin typeface="Alef" panose="00000500000000000000" pitchFamily="2" charset="-79"/>
                 <a:cs typeface="Alef" panose="00000500000000000000" pitchFamily="2" charset="-79"/>
               </a:rPr>
-              <a:t>כשיופיע הכיתוב </a:t>
-            </a:r>
-            <a:r>
-              <a:rPr lang="en-US" sz="4000" dirty="0">
-                <a:latin typeface="Alef" panose="00000500000000000000" pitchFamily="2" charset="-79"/>
-                <a:cs typeface="Alef" panose="00000500000000000000" pitchFamily="2" charset="-79"/>
-              </a:rPr>
-              <a:t>"Play”</a:t>
-            </a:r>
-            <a:r>
-              <a:rPr lang="he-IL" sz="4000" dirty="0">
-                <a:latin typeface="Alef" panose="00000500000000000000" pitchFamily="2" charset="-79"/>
-                <a:cs typeface="Alef" panose="00000500000000000000" pitchFamily="2" charset="-79"/>
-              </a:rPr>
-              <a:t> עליך להתחיל לנגן.</a:t>
+              <a:t>כשיופיע      עליך להתחיל לנגן.</a:t>
             </a:r>
             <a:br>
               <a:rPr lang="he-IL" sz="4000" dirty="0">
@@ -4228,6 +4377,103 @@
           </a:p>
         </p:txBody>
       </p:sp>
+      <p:grpSp>
+        <p:nvGrpSpPr>
+          <p:cNvPr id="6" name="Group 5">
+            <a:extLst>
+              <a:ext uri="{FF2B5EF4-FFF2-40B4-BE49-F238E27FC236}">
+                <a16:creationId xmlns:a16="http://schemas.microsoft.com/office/drawing/2014/main" id="{F3E93AA1-2A90-5CC0-EAA4-8F00573E9537}"/>
+              </a:ext>
+            </a:extLst>
+          </p:cNvPr>
+          <p:cNvGrpSpPr/>
+          <p:nvPr/>
+        </p:nvGrpSpPr>
+        <p:grpSpPr>
+          <a:xfrm>
+            <a:off x="7158682" y="3749016"/>
+            <a:ext cx="403654" cy="403654"/>
+            <a:chOff x="7117492" y="3731741"/>
+            <a:chExt cx="403654" cy="403654"/>
+          </a:xfrm>
+        </p:grpSpPr>
+        <p:cxnSp>
+          <p:nvCxnSpPr>
+            <p:cNvPr id="4" name="Straight Connector 3">
+              <a:extLst>
+                <a:ext uri="{FF2B5EF4-FFF2-40B4-BE49-F238E27FC236}">
+                  <a16:creationId xmlns:a16="http://schemas.microsoft.com/office/drawing/2014/main" id="{DBC7D342-6175-C6E4-E055-DD3125443DD4}"/>
+                </a:ext>
+              </a:extLst>
+            </p:cNvPr>
+            <p:cNvCxnSpPr/>
+            <p:nvPr/>
+          </p:nvCxnSpPr>
+          <p:spPr>
+            <a:xfrm>
+              <a:off x="7315200" y="3731741"/>
+              <a:ext cx="0" cy="403654"/>
+            </a:xfrm>
+            <a:prstGeom prst="line">
+              <a:avLst/>
+            </a:prstGeom>
+            <a:ln w="38100"/>
+          </p:spPr>
+          <p:style>
+            <a:lnRef idx="1">
+              <a:schemeClr val="accent6"/>
+            </a:lnRef>
+            <a:fillRef idx="0">
+              <a:schemeClr val="accent6"/>
+            </a:fillRef>
+            <a:effectRef idx="0">
+              <a:schemeClr val="accent6"/>
+            </a:effectRef>
+            <a:fontRef idx="minor">
+              <a:schemeClr val="tx1"/>
+            </a:fontRef>
+          </p:style>
+        </p:cxnSp>
+        <p:cxnSp>
+          <p:nvCxnSpPr>
+            <p:cNvPr id="5" name="Straight Connector 4">
+              <a:extLst>
+                <a:ext uri="{FF2B5EF4-FFF2-40B4-BE49-F238E27FC236}">
+                  <a16:creationId xmlns:a16="http://schemas.microsoft.com/office/drawing/2014/main" id="{DE20ABD1-8DEE-1A88-E7C9-6AB0BAB6C4E9}"/>
+                </a:ext>
+              </a:extLst>
+            </p:cNvPr>
+            <p:cNvCxnSpPr>
+              <a:cxnSpLocks/>
+            </p:cNvCxnSpPr>
+            <p:nvPr/>
+          </p:nvCxnSpPr>
+          <p:spPr>
+            <a:xfrm rot="5400000">
+              <a:off x="7319319" y="3735860"/>
+              <a:ext cx="0" cy="403654"/>
+            </a:xfrm>
+            <a:prstGeom prst="line">
+              <a:avLst/>
+            </a:prstGeom>
+            <a:ln w="38100"/>
+          </p:spPr>
+          <p:style>
+            <a:lnRef idx="1">
+              <a:schemeClr val="accent6"/>
+            </a:lnRef>
+            <a:fillRef idx="0">
+              <a:schemeClr val="accent6"/>
+            </a:fillRef>
+            <a:effectRef idx="0">
+              <a:schemeClr val="accent6"/>
+            </a:effectRef>
+            <a:fontRef idx="minor">
+              <a:schemeClr val="tx1"/>
+            </a:fontRef>
+          </p:style>
+        </p:cxnSp>
+      </p:grpSp>
     </p:spTree>
     <p:extLst>
       <p:ext uri="{BB962C8B-B14F-4D97-AF65-F5344CB8AC3E}">
@@ -4352,21 +4598,7 @@
                 <a:latin typeface="Alef" panose="00000500000000000000" pitchFamily="2" charset="-79"/>
                 <a:cs typeface="Alef" panose="00000500000000000000" pitchFamily="2" charset="-79"/>
               </a:rPr>
-              <a:t>כשיופיע הכיתוב </a:t>
-            </a:r>
-            <a:r>
-              <a:rPr lang="en-US" sz="4000" dirty="0">
-                <a:latin typeface="Alef" panose="00000500000000000000" pitchFamily="2" charset="-79"/>
-                <a:cs typeface="Alef" panose="00000500000000000000" pitchFamily="2" charset="-79"/>
-              </a:rPr>
-              <a:t>"Play”</a:t>
-            </a:r>
-            <a:r>
-              <a:rPr lang="he-IL" sz="4000" dirty="0">
-                <a:latin typeface="Alef" panose="00000500000000000000" pitchFamily="2" charset="-79"/>
-                <a:cs typeface="Alef" panose="00000500000000000000" pitchFamily="2" charset="-79"/>
-              </a:rPr>
-              <a:t> עליך להתחיל לנגן.</a:t>
+              <a:t>כשיופיע     עליך להתחיל לנגן.</a:t>
             </a:r>
             <a:br>
               <a:rPr lang="he-IL" sz="4000" dirty="0">
@@ -4393,6 +4625,103 @@
           </a:p>
         </p:txBody>
       </p:sp>
+      <p:grpSp>
+        <p:nvGrpSpPr>
+          <p:cNvPr id="3" name="Group 2">
+            <a:extLst>
+              <a:ext uri="{FF2B5EF4-FFF2-40B4-BE49-F238E27FC236}">
+                <a16:creationId xmlns:a16="http://schemas.microsoft.com/office/drawing/2014/main" id="{FF32414C-D0A3-788C-8C07-C51662C03D95}"/>
+              </a:ext>
+            </a:extLst>
+          </p:cNvPr>
+          <p:cNvGrpSpPr/>
+          <p:nvPr/>
+        </p:nvGrpSpPr>
+        <p:grpSpPr>
+          <a:xfrm>
+            <a:off x="7158682" y="3749016"/>
+            <a:ext cx="403654" cy="403654"/>
+            <a:chOff x="7117492" y="3731741"/>
+            <a:chExt cx="403654" cy="403654"/>
+          </a:xfrm>
+        </p:grpSpPr>
+        <p:cxnSp>
+          <p:nvCxnSpPr>
+            <p:cNvPr id="4" name="Straight Connector 3">
+              <a:extLst>
+                <a:ext uri="{FF2B5EF4-FFF2-40B4-BE49-F238E27FC236}">
+                  <a16:creationId xmlns:a16="http://schemas.microsoft.com/office/drawing/2014/main" id="{432486F5-D959-99F4-A594-85243A0BC608}"/>
+                </a:ext>
+              </a:extLst>
+            </p:cNvPr>
+            <p:cNvCxnSpPr/>
+            <p:nvPr/>
+          </p:nvCxnSpPr>
+          <p:spPr>
+            <a:xfrm>
+              <a:off x="7315200" y="3731741"/>
+              <a:ext cx="0" cy="403654"/>
+            </a:xfrm>
+            <a:prstGeom prst="line">
+              <a:avLst/>
+            </a:prstGeom>
+            <a:ln w="38100"/>
+          </p:spPr>
+          <p:style>
+            <a:lnRef idx="1">
+              <a:schemeClr val="accent6"/>
+            </a:lnRef>
+            <a:fillRef idx="0">
+              <a:schemeClr val="accent6"/>
+            </a:fillRef>
+            <a:effectRef idx="0">
+              <a:schemeClr val="accent6"/>
+            </a:effectRef>
+            <a:fontRef idx="minor">
+              <a:schemeClr val="tx1"/>
+            </a:fontRef>
+          </p:style>
+        </p:cxnSp>
+        <p:cxnSp>
+          <p:nvCxnSpPr>
+            <p:cNvPr id="5" name="Straight Connector 4">
+              <a:extLst>
+                <a:ext uri="{FF2B5EF4-FFF2-40B4-BE49-F238E27FC236}">
+                  <a16:creationId xmlns:a16="http://schemas.microsoft.com/office/drawing/2014/main" id="{03D78DC6-B847-01E6-ECE8-5F4A1680A37E}"/>
+                </a:ext>
+              </a:extLst>
+            </p:cNvPr>
+            <p:cNvCxnSpPr>
+              <a:cxnSpLocks/>
+            </p:cNvCxnSpPr>
+            <p:nvPr/>
+          </p:nvCxnSpPr>
+          <p:spPr>
+            <a:xfrm rot="5400000">
+              <a:off x="7319319" y="3735860"/>
+              <a:ext cx="0" cy="403654"/>
+            </a:xfrm>
+            <a:prstGeom prst="line">
+              <a:avLst/>
+            </a:prstGeom>
+            <a:ln w="38100"/>
+          </p:spPr>
+          <p:style>
+            <a:lnRef idx="1">
+              <a:schemeClr val="accent6"/>
+            </a:lnRef>
+            <a:fillRef idx="0">
+              <a:schemeClr val="accent6"/>
+            </a:fillRef>
+            <a:effectRef idx="0">
+              <a:schemeClr val="accent6"/>
+            </a:effectRef>
+            <a:fontRef idx="minor">
+              <a:schemeClr val="tx1"/>
+            </a:fontRef>
+          </p:style>
+        </p:cxnSp>
+      </p:grpSp>
     </p:spTree>
     <p:extLst>
       <p:ext uri="{BB962C8B-B14F-4D97-AF65-F5344CB8AC3E}">
@@ -4503,21 +4832,7 @@
                 <a:latin typeface="Alef" panose="00000500000000000000" pitchFamily="2" charset="-79"/>
                 <a:cs typeface="Alef" panose="00000500000000000000" pitchFamily="2" charset="-79"/>
               </a:rPr>
-              <a:t>כשיופיע הכיתוב </a:t>
-            </a:r>
-            <a:r>
-              <a:rPr lang="en-US" sz="4000" dirty="0">
-                <a:latin typeface="Alef" panose="00000500000000000000" pitchFamily="2" charset="-79"/>
-                <a:cs typeface="Alef" panose="00000500000000000000" pitchFamily="2" charset="-79"/>
-              </a:rPr>
-              <a:t>“Start”</a:t>
-            </a:r>
-            <a:r>
-              <a:rPr lang="he-IL" sz="4000" dirty="0">
-                <a:latin typeface="Alef" panose="00000500000000000000" pitchFamily="2" charset="-79"/>
-                <a:cs typeface="Alef" panose="00000500000000000000" pitchFamily="2" charset="-79"/>
-              </a:rPr>
-              <a:t> עליך להתחיל את הרצף.</a:t>
+              <a:t>כשיופיע      עליך להתחיל את הרצף.</a:t>
             </a:r>
             <a:br>
               <a:rPr lang="he-IL" sz="4000" dirty="0">
@@ -4544,6 +4859,103 @@
           </a:p>
         </p:txBody>
       </p:sp>
+      <p:grpSp>
+        <p:nvGrpSpPr>
+          <p:cNvPr id="6" name="Group 5">
+            <a:extLst>
+              <a:ext uri="{FF2B5EF4-FFF2-40B4-BE49-F238E27FC236}">
+                <a16:creationId xmlns:a16="http://schemas.microsoft.com/office/drawing/2014/main" id="{1B9CDEA8-70D6-687A-1B7A-B4D460F755BC}"/>
+              </a:ext>
+            </a:extLst>
+          </p:cNvPr>
+          <p:cNvGrpSpPr/>
+          <p:nvPr/>
+        </p:nvGrpSpPr>
+        <p:grpSpPr>
+          <a:xfrm>
+            <a:off x="7652952" y="3773729"/>
+            <a:ext cx="403654" cy="403654"/>
+            <a:chOff x="7117492" y="3731741"/>
+            <a:chExt cx="403654" cy="403654"/>
+          </a:xfrm>
+        </p:grpSpPr>
+        <p:cxnSp>
+          <p:nvCxnSpPr>
+            <p:cNvPr id="7" name="Straight Connector 6">
+              <a:extLst>
+                <a:ext uri="{FF2B5EF4-FFF2-40B4-BE49-F238E27FC236}">
+                  <a16:creationId xmlns:a16="http://schemas.microsoft.com/office/drawing/2014/main" id="{19C60393-6E5F-A9B2-F531-8932A8C9735D}"/>
+                </a:ext>
+              </a:extLst>
+            </p:cNvPr>
+            <p:cNvCxnSpPr/>
+            <p:nvPr/>
+          </p:nvCxnSpPr>
+          <p:spPr>
+            <a:xfrm>
+              <a:off x="7315200" y="3731741"/>
+              <a:ext cx="0" cy="403654"/>
+            </a:xfrm>
+            <a:prstGeom prst="line">
+              <a:avLst/>
+            </a:prstGeom>
+            <a:ln w="38100"/>
+          </p:spPr>
+          <p:style>
+            <a:lnRef idx="1">
+              <a:schemeClr val="accent6"/>
+            </a:lnRef>
+            <a:fillRef idx="0">
+              <a:schemeClr val="accent6"/>
+            </a:fillRef>
+            <a:effectRef idx="0">
+              <a:schemeClr val="accent6"/>
+            </a:effectRef>
+            <a:fontRef idx="minor">
+              <a:schemeClr val="tx1"/>
+            </a:fontRef>
+          </p:style>
+        </p:cxnSp>
+        <p:cxnSp>
+          <p:nvCxnSpPr>
+            <p:cNvPr id="8" name="Straight Connector 7">
+              <a:extLst>
+                <a:ext uri="{FF2B5EF4-FFF2-40B4-BE49-F238E27FC236}">
+                  <a16:creationId xmlns:a16="http://schemas.microsoft.com/office/drawing/2014/main" id="{C888C223-ED3D-DA8B-E86A-BC38D71CBB15}"/>
+                </a:ext>
+              </a:extLst>
+            </p:cNvPr>
+            <p:cNvCxnSpPr>
+              <a:cxnSpLocks/>
+            </p:cNvCxnSpPr>
+            <p:nvPr/>
+          </p:nvCxnSpPr>
+          <p:spPr>
+            <a:xfrm rot="5400000">
+              <a:off x="7319319" y="3735860"/>
+              <a:ext cx="0" cy="403654"/>
+            </a:xfrm>
+            <a:prstGeom prst="line">
+              <a:avLst/>
+            </a:prstGeom>
+            <a:ln w="38100"/>
+          </p:spPr>
+          <p:style>
+            <a:lnRef idx="1">
+              <a:schemeClr val="accent6"/>
+            </a:lnRef>
+            <a:fillRef idx="0">
+              <a:schemeClr val="accent6"/>
+            </a:fillRef>
+            <a:effectRef idx="0">
+              <a:schemeClr val="accent6"/>
+            </a:effectRef>
+            <a:fontRef idx="minor">
+              <a:schemeClr val="tx1"/>
+            </a:fontRef>
+          </p:style>
+        </p:cxnSp>
+      </p:grpSp>
     </p:spTree>
     <p:extLst>
       <p:ext uri="{BB962C8B-B14F-4D97-AF65-F5344CB8AC3E}">
@@ -4808,52 +5220,88 @@
           <a:chExt cx="0" cy="0"/>
         </a:xfrm>
       </p:grpSpPr>
-      <p:sp>
-        <p:nvSpPr>
-          <p:cNvPr id="2" name="Title 1">
-            <a:extLst>
-              <a:ext uri="{FF2B5EF4-FFF2-40B4-BE49-F238E27FC236}">
-                <a16:creationId xmlns:a16="http://schemas.microsoft.com/office/drawing/2014/main" id="{ACE86663-AE4B-19FA-35D6-91B28D424C56}"/>
-              </a:ext>
-            </a:extLst>
-          </p:cNvPr>
-          <p:cNvSpPr>
-            <a:spLocks noGrp="1"/>
-          </p:cNvSpPr>
-          <p:nvPr>
-            <p:ph type="ctrTitle"/>
-          </p:nvPr>
-        </p:nvSpPr>
+      <p:cxnSp>
+        <p:nvCxnSpPr>
+          <p:cNvPr id="4" name="Straight Connector 3">
+            <a:extLst>
+              <a:ext uri="{FF2B5EF4-FFF2-40B4-BE49-F238E27FC236}">
+                <a16:creationId xmlns:a16="http://schemas.microsoft.com/office/drawing/2014/main" id="{4C10032A-E247-B3F1-C620-BC2335ECFD30}"/>
+              </a:ext>
+            </a:extLst>
+          </p:cNvPr>
+          <p:cNvCxnSpPr>
+            <a:cxnSpLocks/>
+          </p:cNvCxnSpPr>
+          <p:nvPr/>
+        </p:nvCxnSpPr>
         <p:spPr>
           <a:xfrm>
-            <a:off x="1244081" y="2967807"/>
-            <a:ext cx="10064620" cy="922386"/>
+            <a:off x="6153665" y="2916196"/>
+            <a:ext cx="0" cy="1080000"/>
           </a:xfrm>
+          <a:prstGeom prst="line">
+            <a:avLst/>
+          </a:prstGeom>
+          <a:ln w="57150"/>
         </p:spPr>
-        <p:txBody>
-          <a:bodyPr anchor="ctr">
-            <a:normAutofit/>
-          </a:bodyPr>
-          <a:lstStyle/>
-          <a:p>
-            <a:r>
-              <a:rPr lang="en-US" sz="5000" dirty="0">
-                <a:latin typeface="Alef" panose="00000500000000000000" pitchFamily="2" charset="-79"/>
-                <a:cs typeface="Alef" panose="00000500000000000000" pitchFamily="2" charset="-79"/>
-              </a:rPr>
-              <a:t>Start! </a:t>
-            </a:r>
-            <a:endParaRPr lang="en-IL" sz="5000" dirty="0">
-              <a:latin typeface="Alef" panose="00000500000000000000" pitchFamily="2" charset="-79"/>
-              <a:cs typeface="Alef" panose="00000500000000000000" pitchFamily="2" charset="-79"/>
-            </a:endParaRPr>
-          </a:p>
-        </p:txBody>
-      </p:sp>
+        <p:style>
+          <a:lnRef idx="1">
+            <a:schemeClr val="accent6"/>
+          </a:lnRef>
+          <a:fillRef idx="0">
+            <a:schemeClr val="accent6"/>
+          </a:fillRef>
+          <a:effectRef idx="0">
+            <a:schemeClr val="accent6"/>
+          </a:effectRef>
+          <a:fontRef idx="minor">
+            <a:schemeClr val="tx1"/>
+          </a:fontRef>
+        </p:style>
+      </p:cxnSp>
+      <p:cxnSp>
+        <p:nvCxnSpPr>
+          <p:cNvPr id="5" name="Straight Connector 4">
+            <a:extLst>
+              <a:ext uri="{FF2B5EF4-FFF2-40B4-BE49-F238E27FC236}">
+                <a16:creationId xmlns:a16="http://schemas.microsoft.com/office/drawing/2014/main" id="{14ACC48A-4BAD-C284-DE19-1BB6206D7D20}"/>
+              </a:ext>
+            </a:extLst>
+          </p:cNvPr>
+          <p:cNvCxnSpPr>
+            <a:cxnSpLocks/>
+          </p:cNvCxnSpPr>
+          <p:nvPr/>
+        </p:nvCxnSpPr>
+        <p:spPr>
+          <a:xfrm rot="16200000">
+            <a:off x="6170562" y="2930189"/>
+            <a:ext cx="0" cy="1080000"/>
+          </a:xfrm>
+          <a:prstGeom prst="line">
+            <a:avLst/>
+          </a:prstGeom>
+          <a:ln w="57150"/>
+        </p:spPr>
+        <p:style>
+          <a:lnRef idx="1">
+            <a:schemeClr val="accent6"/>
+          </a:lnRef>
+          <a:fillRef idx="0">
+            <a:schemeClr val="accent6"/>
+          </a:fillRef>
+          <a:effectRef idx="0">
+            <a:schemeClr val="accent6"/>
+          </a:effectRef>
+          <a:fontRef idx="minor">
+            <a:schemeClr val="tx1"/>
+          </a:fontRef>
+        </p:style>
+      </p:cxnSp>
     </p:spTree>
     <p:extLst>
       <p:ext uri="{BB962C8B-B14F-4D97-AF65-F5344CB8AC3E}">
-        <p14:creationId xmlns:p14="http://schemas.microsoft.com/office/powerpoint/2010/main" val="1562070818"/>
+        <p14:creationId xmlns:p14="http://schemas.microsoft.com/office/powerpoint/2010/main" val="4231421957"/>
       </p:ext>
     </p:extLst>
   </p:cSld>
@@ -4888,57 +5336,101 @@
           <a:chExt cx="0" cy="0"/>
         </a:xfrm>
       </p:grpSpPr>
-      <p:sp>
-        <p:nvSpPr>
-          <p:cNvPr id="2" name="Title 1">
-            <a:extLst>
-              <a:ext uri="{FF2B5EF4-FFF2-40B4-BE49-F238E27FC236}">
-                <a16:creationId xmlns:a16="http://schemas.microsoft.com/office/drawing/2014/main" id="{ACE86663-AE4B-19FA-35D6-91B28D424C56}"/>
-              </a:ext>
-            </a:extLst>
-          </p:cNvPr>
-          <p:cNvSpPr>
-            <a:spLocks noGrp="1"/>
-          </p:cNvSpPr>
-          <p:nvPr>
-            <p:ph type="ctrTitle"/>
-          </p:nvPr>
-        </p:nvSpPr>
+      <p:cxnSp>
+        <p:nvCxnSpPr>
+          <p:cNvPr id="4" name="Straight Connector 3">
+            <a:extLst>
+              <a:ext uri="{FF2B5EF4-FFF2-40B4-BE49-F238E27FC236}">
+                <a16:creationId xmlns:a16="http://schemas.microsoft.com/office/drawing/2014/main" id="{4C10032A-E247-B3F1-C620-BC2335ECFD30}"/>
+              </a:ext>
+            </a:extLst>
+          </p:cNvPr>
+          <p:cNvCxnSpPr>
+            <a:cxnSpLocks/>
+          </p:cNvCxnSpPr>
+          <p:nvPr/>
+        </p:nvCxnSpPr>
         <p:spPr>
           <a:xfrm>
-            <a:off x="1244081" y="2967807"/>
-            <a:ext cx="10064620" cy="922386"/>
+            <a:off x="6153665" y="2916196"/>
+            <a:ext cx="0" cy="1080000"/>
           </a:xfrm>
+          <a:prstGeom prst="line">
+            <a:avLst/>
+          </a:prstGeom>
+          <a:ln w="57150">
+            <a:solidFill>
+              <a:schemeClr val="tx1"/>
+            </a:solidFill>
+          </a:ln>
         </p:spPr>
-        <p:txBody>
-          <a:bodyPr anchor="ctr">
-            <a:normAutofit/>
-          </a:bodyPr>
-          <a:lstStyle/>
-          <a:p>
-            <a:r>
-              <a:rPr lang="en-US" sz="5000" dirty="0">
-                <a:latin typeface="Alef" panose="00000500000000000000" pitchFamily="2" charset="-79"/>
-                <a:cs typeface="Alef" panose="00000500000000000000" pitchFamily="2" charset="-79"/>
-              </a:rPr>
-              <a:t>Get ready…</a:t>
-            </a:r>
-            <a:endParaRPr lang="en-IL" sz="5000" dirty="0">
-              <a:latin typeface="Alef" panose="00000500000000000000" pitchFamily="2" charset="-79"/>
-              <a:cs typeface="Alef" panose="00000500000000000000" pitchFamily="2" charset="-79"/>
-            </a:endParaRPr>
-          </a:p>
-        </p:txBody>
-      </p:sp>
+        <p:style>
+          <a:lnRef idx="1">
+            <a:schemeClr val="accent6"/>
+          </a:lnRef>
+          <a:fillRef idx="0">
+            <a:schemeClr val="accent6"/>
+          </a:fillRef>
+          <a:effectRef idx="0">
+            <a:schemeClr val="accent6"/>
+          </a:effectRef>
+          <a:fontRef idx="minor">
+            <a:schemeClr val="tx1"/>
+          </a:fontRef>
+        </p:style>
+      </p:cxnSp>
+      <p:cxnSp>
+        <p:nvCxnSpPr>
+          <p:cNvPr id="5" name="Straight Connector 4">
+            <a:extLst>
+              <a:ext uri="{FF2B5EF4-FFF2-40B4-BE49-F238E27FC236}">
+                <a16:creationId xmlns:a16="http://schemas.microsoft.com/office/drawing/2014/main" id="{14ACC48A-4BAD-C284-DE19-1BB6206D7D20}"/>
+              </a:ext>
+            </a:extLst>
+          </p:cNvPr>
+          <p:cNvCxnSpPr>
+            <a:cxnSpLocks/>
+          </p:cNvCxnSpPr>
+          <p:nvPr/>
+        </p:nvCxnSpPr>
+        <p:spPr>
+          <a:xfrm rot="16200000">
+            <a:off x="6170562" y="2930189"/>
+            <a:ext cx="0" cy="1080000"/>
+          </a:xfrm>
+          <a:prstGeom prst="line">
+            <a:avLst/>
+          </a:prstGeom>
+          <a:ln w="57150">
+            <a:solidFill>
+              <a:schemeClr val="tx1"/>
+            </a:solidFill>
+          </a:ln>
+        </p:spPr>
+        <p:style>
+          <a:lnRef idx="1">
+            <a:schemeClr val="accent6"/>
+          </a:lnRef>
+          <a:fillRef idx="0">
+            <a:schemeClr val="accent6"/>
+          </a:fillRef>
+          <a:effectRef idx="0">
+            <a:schemeClr val="accent6"/>
+          </a:effectRef>
+          <a:fontRef idx="minor">
+            <a:schemeClr val="tx1"/>
+          </a:fontRef>
+        </p:style>
+      </p:cxnSp>
     </p:spTree>
     <p:extLst>
       <p:ext uri="{BB962C8B-B14F-4D97-AF65-F5344CB8AC3E}">
-        <p14:creationId xmlns:p14="http://schemas.microsoft.com/office/powerpoint/2010/main" val="3960370162"/>
+        <p14:creationId xmlns:p14="http://schemas.microsoft.com/office/powerpoint/2010/main" val="3987380765"/>
       </p:ext>
     </p:extLst>
   </p:cSld>
   <p:clrMapOvr>
-    <a:masterClrMapping/>
+    <a:overrideClrMapping bg1="lt1" tx1="dk1" bg2="lt2" tx2="dk2" accent1="accent1" accent2="accent2" accent3="accent3" accent4="accent4" accent5="accent5" accent6="accent6" hlink="hlink" folHlink="folHlink"/>
   </p:clrMapOvr>
 </p:sld>
 </file>
@@ -4989,7 +5481,6 @@
             <a:off x="1244081" y="2967807"/>
             <a:ext cx="10064620" cy="922386"/>
           </a:xfrm>
-          <a:noFill/>
         </p:spPr>
         <p:txBody>
           <a:bodyPr anchor="ctr">
@@ -5002,7 +5493,7 @@
                 <a:latin typeface="Alef" panose="00000500000000000000" pitchFamily="2" charset="-79"/>
                 <a:cs typeface="Alef" panose="00000500000000000000" pitchFamily="2" charset="-79"/>
               </a:rPr>
-              <a:t>Listen</a:t>
+              <a:t>Start! </a:t>
             </a:r>
             <a:endParaRPr lang="en-IL" sz="5000" dirty="0">
               <a:latin typeface="Alef" panose="00000500000000000000" pitchFamily="2" charset="-79"/>
@@ -5014,12 +5505,12 @@
     </p:spTree>
     <p:extLst>
       <p:ext uri="{BB962C8B-B14F-4D97-AF65-F5344CB8AC3E}">
-        <p14:creationId xmlns:p14="http://schemas.microsoft.com/office/powerpoint/2010/main" val="2212213509"/>
+        <p14:creationId xmlns:p14="http://schemas.microsoft.com/office/powerpoint/2010/main" val="1562070818"/>
       </p:ext>
     </p:extLst>
   </p:cSld>
   <p:clrMapOvr>
-    <a:masterClrMapping/>
+    <a:overrideClrMapping bg1="lt1" tx1="dk1" bg2="lt2" tx2="dk2" accent1="accent1" accent2="accent2" accent3="accent3" accent4="accent4" accent5="accent5" accent6="accent6" hlink="hlink" folHlink="folHlink"/>
   </p:clrMapOvr>
 </p:sld>
 </file>
@@ -5575,4 +6066,90 @@
     </a:folHlink>
   </a:clrScheme>
 </a:themeOverride>
+</file>
+
+<file path=ppt/theme/themeOverride7.xml><?xml version="1.0" encoding="utf-8"?>
+<a:themeOverride xmlns:a="http://schemas.openxmlformats.org/drawingml/2006/main">
+  <a:clrScheme name="Office">
+    <a:dk1>
+      <a:sysClr val="windowText" lastClr="000000"/>
+    </a:dk1>
+    <a:lt1>
+      <a:sysClr val="window" lastClr="FFFFFF"/>
+    </a:lt1>
+    <a:dk2>
+      <a:srgbClr val="44546A"/>
+    </a:dk2>
+    <a:lt2>
+      <a:srgbClr val="E7E6E6"/>
+    </a:lt2>
+    <a:accent1>
+      <a:srgbClr val="4472C4"/>
+    </a:accent1>
+    <a:accent2>
+      <a:srgbClr val="ED7D31"/>
+    </a:accent2>
+    <a:accent3>
+      <a:srgbClr val="A5A5A5"/>
+    </a:accent3>
+    <a:accent4>
+      <a:srgbClr val="FFC000"/>
+    </a:accent4>
+    <a:accent5>
+      <a:srgbClr val="5B9BD5"/>
+    </a:accent5>
+    <a:accent6>
+      <a:srgbClr val="70AD47"/>
+    </a:accent6>
+    <a:hlink>
+      <a:srgbClr val="0563C1"/>
+    </a:hlink>
+    <a:folHlink>
+      <a:srgbClr val="954F72"/>
+    </a:folHlink>
+  </a:clrScheme>
+</a:themeOverride>
+</file>
+
+<file path=ppt/theme/themeOverride8.xml><?xml version="1.0" encoding="utf-8"?>
+<a:themeOverride xmlns:a="http://schemas.openxmlformats.org/drawingml/2006/main">
+  <a:clrScheme name="Office">
+    <a:dk1>
+      <a:sysClr val="windowText" lastClr="000000"/>
+    </a:dk1>
+    <a:lt1>
+      <a:sysClr val="window" lastClr="FFFFFF"/>
+    </a:lt1>
+    <a:dk2>
+      <a:srgbClr val="44546A"/>
+    </a:dk2>
+    <a:lt2>
+      <a:srgbClr val="E7E6E6"/>
+    </a:lt2>
+    <a:accent1>
+      <a:srgbClr val="4472C4"/>
+    </a:accent1>
+    <a:accent2>
+      <a:srgbClr val="ED7D31"/>
+    </a:accent2>
+    <a:accent3>
+      <a:srgbClr val="A5A5A5"/>
+    </a:accent3>
+    <a:accent4>
+      <a:srgbClr val="FFC000"/>
+    </a:accent4>
+    <a:accent5>
+      <a:srgbClr val="5B9BD5"/>
+    </a:accent5>
+    <a:accent6>
+      <a:srgbClr val="70AD47"/>
+    </a:accent6>
+    <a:hlink>
+      <a:srgbClr val="0563C1"/>
+    </a:hlink>
+    <a:folHlink>
+      <a:srgbClr val="954F72"/>
+    </a:folHlink>
+  </a:clrScheme>
+</a:themeOverride>
 </file>
</xml_diff>